<commit_message>
doc/matlab-language-server-lsp-mode.org - add find references
</commit_message>
<xml_diff>
--- a/doc/matlab-language-server-lsp-mode-files/lsp-mode-annotated-pictures.pptx
+++ b/doc/matlab-language-server-lsp-mode-files/lsp-mode-annotated-pictures.pptx
@@ -8,6 +8,7 @@
     <p:sldId id="256" r:id="rId2"/>
     <p:sldId id="257" r:id="rId3"/>
     <p:sldId id="258" r:id="rId4"/>
+    <p:sldId id="259" r:id="rId5"/>
   </p:sldIdLst>
   <p:sldSz cx="12192000" cy="6858000"/>
   <p:notesSz cx="6858000" cy="9144000"/>
@@ -106,6 +107,11 @@
       </a:defRPr>
     </a:lvl9pPr>
   </p:defaultTextStyle>
+  <p:extLst>
+    <p:ext uri="{EFAFB233-063F-42B5-8137-9DF3F51BA10A}">
+      <p15:sldGuideLst xmlns:p15="http://schemas.microsoft.com/office/powerpoint/2012/main"/>
+    </p:ext>
+  </p:extLst>
 </p:presentation>
 </file>
 
@@ -256,7 +262,7 @@
           <a:p>
             <a:fld id="{DA4E0E8B-2AB5-4E74-AB7F-ECB38F568689}" type="datetimeFigureOut">
               <a:rPr lang="en-US" smtClean="0"/>
-              <a:t>5/29/2025</a:t>
+              <a:t>5/30/2025</a:t>
             </a:fld>
             <a:endParaRPr lang="en-US"/>
           </a:p>
@@ -454,7 +460,7 @@
           <a:p>
             <a:fld id="{DA4E0E8B-2AB5-4E74-AB7F-ECB38F568689}" type="datetimeFigureOut">
               <a:rPr lang="en-US" smtClean="0"/>
-              <a:t>5/29/2025</a:t>
+              <a:t>5/30/2025</a:t>
             </a:fld>
             <a:endParaRPr lang="en-US"/>
           </a:p>
@@ -662,7 +668,7 @@
           <a:p>
             <a:fld id="{DA4E0E8B-2AB5-4E74-AB7F-ECB38F568689}" type="datetimeFigureOut">
               <a:rPr lang="en-US" smtClean="0"/>
-              <a:t>5/29/2025</a:t>
+              <a:t>5/30/2025</a:t>
             </a:fld>
             <a:endParaRPr lang="en-US"/>
           </a:p>
@@ -860,7 +866,7 @@
           <a:p>
             <a:fld id="{DA4E0E8B-2AB5-4E74-AB7F-ECB38F568689}" type="datetimeFigureOut">
               <a:rPr lang="en-US" smtClean="0"/>
-              <a:t>5/29/2025</a:t>
+              <a:t>5/30/2025</a:t>
             </a:fld>
             <a:endParaRPr lang="en-US"/>
           </a:p>
@@ -1135,7 +1141,7 @@
           <a:p>
             <a:fld id="{DA4E0E8B-2AB5-4E74-AB7F-ECB38F568689}" type="datetimeFigureOut">
               <a:rPr lang="en-US" smtClean="0"/>
-              <a:t>5/29/2025</a:t>
+              <a:t>5/30/2025</a:t>
             </a:fld>
             <a:endParaRPr lang="en-US"/>
           </a:p>
@@ -1400,7 +1406,7 @@
           <a:p>
             <a:fld id="{DA4E0E8B-2AB5-4E74-AB7F-ECB38F568689}" type="datetimeFigureOut">
               <a:rPr lang="en-US" smtClean="0"/>
-              <a:t>5/29/2025</a:t>
+              <a:t>5/30/2025</a:t>
             </a:fld>
             <a:endParaRPr lang="en-US"/>
           </a:p>
@@ -1812,7 +1818,7 @@
           <a:p>
             <a:fld id="{DA4E0E8B-2AB5-4E74-AB7F-ECB38F568689}" type="datetimeFigureOut">
               <a:rPr lang="en-US" smtClean="0"/>
-              <a:t>5/29/2025</a:t>
+              <a:t>5/30/2025</a:t>
             </a:fld>
             <a:endParaRPr lang="en-US"/>
           </a:p>
@@ -1953,7 +1959,7 @@
           <a:p>
             <a:fld id="{DA4E0E8B-2AB5-4E74-AB7F-ECB38F568689}" type="datetimeFigureOut">
               <a:rPr lang="en-US" smtClean="0"/>
-              <a:t>5/29/2025</a:t>
+              <a:t>5/30/2025</a:t>
             </a:fld>
             <a:endParaRPr lang="en-US"/>
           </a:p>
@@ -2066,7 +2072,7 @@
           <a:p>
             <a:fld id="{DA4E0E8B-2AB5-4E74-AB7F-ECB38F568689}" type="datetimeFigureOut">
               <a:rPr lang="en-US" smtClean="0"/>
-              <a:t>5/29/2025</a:t>
+              <a:t>5/30/2025</a:t>
             </a:fld>
             <a:endParaRPr lang="en-US"/>
           </a:p>
@@ -2377,7 +2383,7 @@
           <a:p>
             <a:fld id="{DA4E0E8B-2AB5-4E74-AB7F-ECB38F568689}" type="datetimeFigureOut">
               <a:rPr lang="en-US" smtClean="0"/>
-              <a:t>5/29/2025</a:t>
+              <a:t>5/30/2025</a:t>
             </a:fld>
             <a:endParaRPr lang="en-US"/>
           </a:p>
@@ -2665,7 +2671,7 @@
           <a:p>
             <a:fld id="{DA4E0E8B-2AB5-4E74-AB7F-ECB38F568689}" type="datetimeFigureOut">
               <a:rPr lang="en-US" smtClean="0"/>
-              <a:t>5/29/2025</a:t>
+              <a:t>5/30/2025</a:t>
             </a:fld>
             <a:endParaRPr lang="en-US"/>
           </a:p>
@@ -2906,7 +2912,7 @@
           <a:p>
             <a:fld id="{DA4E0E8B-2AB5-4E74-AB7F-ECB38F568689}" type="datetimeFigureOut">
               <a:rPr lang="en-US" smtClean="0"/>
-              <a:t>5/29/2025</a:t>
+              <a:t>5/30/2025</a:t>
             </a:fld>
             <a:endParaRPr lang="en-US"/>
           </a:p>
@@ -3939,6 +3945,358 @@
 </p:sld>
 </file>
 
+<file path=ppt/slides/slide4.xml><?xml version="1.0" encoding="utf-8"?>
+<p:sld xmlns:a="http://schemas.openxmlformats.org/drawingml/2006/main" xmlns:r="http://schemas.openxmlformats.org/officeDocument/2006/relationships" xmlns:p="http://schemas.openxmlformats.org/presentationml/2006/main">
+  <p:cSld>
+    <p:spTree>
+      <p:nvGrpSpPr>
+        <p:cNvPr id="1" name=""/>
+        <p:cNvGrpSpPr/>
+        <p:nvPr/>
+      </p:nvGrpSpPr>
+      <p:grpSpPr>
+        <a:xfrm>
+          <a:off x="0" y="0"/>
+          <a:ext cx="0" cy="0"/>
+          <a:chOff x="0" y="0"/>
+          <a:chExt cx="0" cy="0"/>
+        </a:xfrm>
+      </p:grpSpPr>
+      <p:pic>
+        <p:nvPicPr>
+          <p:cNvPr id="5" name="Picture 4">
+            <a:extLst>
+              <a:ext uri="{FF2B5EF4-FFF2-40B4-BE49-F238E27FC236}">
+                <a16:creationId xmlns:a16="http://schemas.microsoft.com/office/drawing/2014/main" id="{BE2A51FE-2EC6-C996-493F-45AD0E10E41C}"/>
+              </a:ext>
+            </a:extLst>
+          </p:cNvPr>
+          <p:cNvPicPr>
+            <a:picLocks noChangeAspect="1"/>
+          </p:cNvPicPr>
+          <p:nvPr/>
+        </p:nvPicPr>
+        <p:blipFill>
+          <a:blip r:embed="rId2"/>
+          <a:stretch>
+            <a:fillRect/>
+          </a:stretch>
+        </p:blipFill>
+        <p:spPr>
+          <a:xfrm>
+            <a:off x="2350408" y="0"/>
+            <a:ext cx="7491184" cy="6858000"/>
+          </a:xfrm>
+          <a:prstGeom prst="rect">
+            <a:avLst/>
+          </a:prstGeom>
+        </p:spPr>
+      </p:pic>
+      <p:grpSp>
+        <p:nvGrpSpPr>
+          <p:cNvPr id="9" name="Group 8">
+            <a:extLst>
+              <a:ext uri="{FF2B5EF4-FFF2-40B4-BE49-F238E27FC236}">
+                <a16:creationId xmlns:a16="http://schemas.microsoft.com/office/drawing/2014/main" id="{01F5ECCC-EFE1-AD7E-936E-B67A52D17B11}"/>
+              </a:ext>
+            </a:extLst>
+          </p:cNvPr>
+          <p:cNvGrpSpPr/>
+          <p:nvPr/>
+        </p:nvGrpSpPr>
+        <p:grpSpPr>
+          <a:xfrm>
+            <a:off x="5038928" y="1119543"/>
+            <a:ext cx="3625579" cy="601389"/>
+            <a:chOff x="5038928" y="1119543"/>
+            <a:chExt cx="3625579" cy="601389"/>
+          </a:xfrm>
+        </p:grpSpPr>
+        <p:sp>
+          <p:nvSpPr>
+            <p:cNvPr id="7" name="Speech Bubble: Rectangle with Corners Rounded 6">
+              <a:extLst>
+                <a:ext uri="{FF2B5EF4-FFF2-40B4-BE49-F238E27FC236}">
+                  <a16:creationId xmlns:a16="http://schemas.microsoft.com/office/drawing/2014/main" id="{CA1B29D6-9866-2F2A-5AAB-A78C72CB4A8B}"/>
+                </a:ext>
+              </a:extLst>
+            </p:cNvPr>
+            <p:cNvSpPr/>
+            <p:nvPr/>
+          </p:nvSpPr>
+          <p:spPr>
+            <a:xfrm>
+              <a:off x="5038928" y="1119543"/>
+              <a:ext cx="3625579" cy="601389"/>
+            </a:xfrm>
+            <a:prstGeom prst="wedgeRoundRectCallout">
+              <a:avLst>
+                <a:gd name="adj1" fmla="val -76353"/>
+                <a:gd name="adj2" fmla="val -62519"/>
+                <a:gd name="adj3" fmla="val 16667"/>
+              </a:avLst>
+            </a:prstGeom>
+            <a:solidFill>
+              <a:srgbClr val="FFE697"/>
+            </a:solidFill>
+          </p:spPr>
+          <p:style>
+            <a:lnRef idx="2">
+              <a:schemeClr val="accent1">
+                <a:shade val="15000"/>
+              </a:schemeClr>
+            </a:lnRef>
+            <a:fillRef idx="1">
+              <a:schemeClr val="accent1"/>
+            </a:fillRef>
+            <a:effectRef idx="0">
+              <a:schemeClr val="accent1"/>
+            </a:effectRef>
+            <a:fontRef idx="minor">
+              <a:schemeClr val="lt1"/>
+            </a:fontRef>
+          </p:style>
+          <p:txBody>
+            <a:bodyPr rtlCol="0" anchor="ctr"/>
+            <a:lstStyle/>
+            <a:p>
+              <a:pPr algn="ctr"/>
+              <a:r>
+                <a:rPr lang="en-US" sz="1200" dirty="0">
+                  <a:solidFill>
+                    <a:schemeClr val="tx1"/>
+                  </a:solidFill>
+                  <a:latin typeface="Consolas" panose="020B0609020204030204" pitchFamily="49" charset="0"/>
+                </a:rPr>
+                <a:t>M-? (M-x </a:t>
+              </a:r>
+              <a:r>
+                <a:rPr lang="en-US" sz="1200" dirty="0" err="1">
+                  <a:solidFill>
+                    <a:schemeClr val="tx1"/>
+                  </a:solidFill>
+                  <a:latin typeface="Consolas" panose="020B0609020204030204" pitchFamily="49" charset="0"/>
+                </a:rPr>
+                <a:t>xref</a:t>
+              </a:r>
+              <a:r>
+                <a:rPr lang="en-US" sz="1200" dirty="0">
+                  <a:solidFill>
+                    <a:schemeClr val="tx1"/>
+                  </a:solidFill>
+                  <a:latin typeface="Consolas" panose="020B0609020204030204" pitchFamily="49" charset="0"/>
+                </a:rPr>
+                <a:t>-find-references)</a:t>
+              </a:r>
+            </a:p>
+          </p:txBody>
+        </p:sp>
+        <p:sp>
+          <p:nvSpPr>
+            <p:cNvPr id="8" name="Oval 7">
+              <a:extLst>
+                <a:ext uri="{FF2B5EF4-FFF2-40B4-BE49-F238E27FC236}">
+                  <a16:creationId xmlns:a16="http://schemas.microsoft.com/office/drawing/2014/main" id="{6BD93FE0-C3D5-2F84-37B7-462496312A8F}"/>
+                </a:ext>
+              </a:extLst>
+            </p:cNvPr>
+            <p:cNvSpPr/>
+            <p:nvPr/>
+          </p:nvSpPr>
+          <p:spPr>
+            <a:xfrm>
+              <a:off x="5175115" y="1254868"/>
+              <a:ext cx="330740" cy="330741"/>
+            </a:xfrm>
+            <a:prstGeom prst="ellipse">
+              <a:avLst/>
+            </a:prstGeom>
+          </p:spPr>
+          <p:style>
+            <a:lnRef idx="2">
+              <a:schemeClr val="accent1">
+                <a:shade val="15000"/>
+              </a:schemeClr>
+            </a:lnRef>
+            <a:fillRef idx="1">
+              <a:schemeClr val="accent1"/>
+            </a:fillRef>
+            <a:effectRef idx="0">
+              <a:schemeClr val="accent1"/>
+            </a:effectRef>
+            <a:fontRef idx="minor">
+              <a:schemeClr val="lt1"/>
+            </a:fontRef>
+          </p:style>
+          <p:txBody>
+            <a:bodyPr rtlCol="0" anchor="ctr"/>
+            <a:lstStyle/>
+            <a:p>
+              <a:pPr algn="ctr"/>
+              <a:r>
+                <a:rPr lang="en-US" dirty="0"/>
+                <a:t>1</a:t>
+              </a:r>
+            </a:p>
+          </p:txBody>
+        </p:sp>
+      </p:grpSp>
+      <p:sp>
+        <p:nvSpPr>
+          <p:cNvPr id="11" name="Speech Bubble: Rectangle with Corners Rounded 10">
+            <a:extLst>
+              <a:ext uri="{FF2B5EF4-FFF2-40B4-BE49-F238E27FC236}">
+                <a16:creationId xmlns:a16="http://schemas.microsoft.com/office/drawing/2014/main" id="{0C713E5C-06A8-9EAD-0C5E-3EE1FBCA7714}"/>
+              </a:ext>
+            </a:extLst>
+          </p:cNvPr>
+          <p:cNvSpPr/>
+          <p:nvPr/>
+        </p:nvSpPr>
+        <p:spPr>
+          <a:xfrm>
+            <a:off x="6945549" y="1926077"/>
+            <a:ext cx="2714017" cy="914398"/>
+          </a:xfrm>
+          <a:prstGeom prst="wedgeRoundRectCallout">
+            <a:avLst>
+              <a:gd name="adj1" fmla="val -72460"/>
+              <a:gd name="adj2" fmla="val -35021"/>
+              <a:gd name="adj3" fmla="val 16667"/>
+            </a:avLst>
+          </a:prstGeom>
+          <a:solidFill>
+            <a:srgbClr val="FFE697"/>
+          </a:solidFill>
+        </p:spPr>
+        <p:style>
+          <a:lnRef idx="2">
+            <a:schemeClr val="accent1">
+              <a:shade val="15000"/>
+            </a:schemeClr>
+          </a:lnRef>
+          <a:fillRef idx="1">
+            <a:schemeClr val="accent1"/>
+          </a:fillRef>
+          <a:effectRef idx="0">
+            <a:schemeClr val="accent1"/>
+          </a:effectRef>
+          <a:fontRef idx="minor">
+            <a:schemeClr val="lt1"/>
+          </a:fontRef>
+        </p:style>
+        <p:txBody>
+          <a:bodyPr rtlCol="0" anchor="ctr"/>
+          <a:lstStyle/>
+          <a:p>
+            <a:pPr algn="ctr"/>
+            <a:r>
+              <a:rPr lang="en-US" sz="1200" dirty="0">
+                <a:solidFill>
+                  <a:schemeClr val="tx1"/>
+                </a:solidFill>
+                <a:latin typeface="Arial" panose="020B0604020202020204" pitchFamily="34" charset="0"/>
+                <a:cs typeface="Arial" panose="020B0604020202020204" pitchFamily="34" charset="0"/>
+              </a:rPr>
+              <a:t>Finds references in several files.</a:t>
+            </a:r>
+          </a:p>
+          <a:p>
+            <a:pPr algn="ctr"/>
+            <a:r>
+              <a:rPr lang="en-US" sz="1200" dirty="0">
+                <a:solidFill>
+                  <a:schemeClr val="tx1"/>
+                </a:solidFill>
+                <a:latin typeface="Arial" panose="020B0604020202020204" pitchFamily="34" charset="0"/>
+                <a:cs typeface="Arial" panose="020B0604020202020204" pitchFamily="34" charset="0"/>
+              </a:rPr>
+              <a:t>Click on references to visit</a:t>
+            </a:r>
+            <a:br>
+              <a:rPr lang="en-US" sz="1200" dirty="0">
+                <a:solidFill>
+                  <a:schemeClr val="tx1"/>
+                </a:solidFill>
+                <a:latin typeface="Arial" panose="020B0604020202020204" pitchFamily="34" charset="0"/>
+                <a:cs typeface="Arial" panose="020B0604020202020204" pitchFamily="34" charset="0"/>
+              </a:rPr>
+            </a:br>
+            <a:r>
+              <a:rPr lang="en-US" sz="1200" dirty="0">
+                <a:solidFill>
+                  <a:schemeClr val="tx1"/>
+                </a:solidFill>
+                <a:latin typeface="Arial" panose="020B0604020202020204" pitchFamily="34" charset="0"/>
+                <a:cs typeface="Arial" panose="020B0604020202020204" pitchFamily="34" charset="0"/>
+              </a:rPr>
+              <a:t>the files they reside in</a:t>
+            </a:r>
+          </a:p>
+        </p:txBody>
+      </p:sp>
+      <p:sp>
+        <p:nvSpPr>
+          <p:cNvPr id="13" name="Oval 12">
+            <a:extLst>
+              <a:ext uri="{FF2B5EF4-FFF2-40B4-BE49-F238E27FC236}">
+                <a16:creationId xmlns:a16="http://schemas.microsoft.com/office/drawing/2014/main" id="{D15795A3-F778-C655-2813-3548EDEB3B9D}"/>
+              </a:ext>
+            </a:extLst>
+          </p:cNvPr>
+          <p:cNvSpPr/>
+          <p:nvPr/>
+        </p:nvSpPr>
+        <p:spPr>
+          <a:xfrm>
+            <a:off x="7042827" y="2322321"/>
+            <a:ext cx="330740" cy="330741"/>
+          </a:xfrm>
+          <a:prstGeom prst="ellipse">
+            <a:avLst/>
+          </a:prstGeom>
+        </p:spPr>
+        <p:style>
+          <a:lnRef idx="2">
+            <a:schemeClr val="accent1">
+              <a:shade val="15000"/>
+            </a:schemeClr>
+          </a:lnRef>
+          <a:fillRef idx="1">
+            <a:schemeClr val="accent1"/>
+          </a:fillRef>
+          <a:effectRef idx="0">
+            <a:schemeClr val="accent1"/>
+          </a:effectRef>
+          <a:fontRef idx="minor">
+            <a:schemeClr val="lt1"/>
+          </a:fontRef>
+        </p:style>
+        <p:txBody>
+          <a:bodyPr rtlCol="0" anchor="ctr"/>
+          <a:lstStyle/>
+          <a:p>
+            <a:pPr algn="ctr"/>
+            <a:r>
+              <a:rPr lang="en-US" dirty="0"/>
+              <a:t>2</a:t>
+            </a:r>
+          </a:p>
+        </p:txBody>
+      </p:sp>
+    </p:spTree>
+    <p:extLst>
+      <p:ext uri="{BB962C8B-B14F-4D97-AF65-F5344CB8AC3E}">
+        <p14:creationId xmlns:p14="http://schemas.microsoft.com/office/powerpoint/2010/main" val="2918242355"/>
+      </p:ext>
+    </p:extLst>
+  </p:cSld>
+  <p:clrMapOvr>
+    <a:masterClrMapping/>
+  </p:clrMapOvr>
+</p:sld>
+</file>
+
 <file path=ppt/theme/theme1.xml><?xml version="1.0" encoding="utf-8"?>
 <a:theme xmlns:a="http://schemas.openxmlformats.org/drawingml/2006/main" name="Office Theme">
   <a:themeElements>

</xml_diff>